<commit_message>
updated Deck and Text to branch
</commit_message>
<xml_diff>
--- a/Mock Deck.pptx
+++ b/Mock Deck.pptx
@@ -104,7 +104,41 @@
       </a:defRPr>
     </a:lvl9pPr>
   </p:defaultTextStyle>
+  <p:extLst>
+    <p:ext uri="{EFAFB233-063F-42B5-8137-9DF3F51BA10A}">
+      <p15:sldGuideLst xmlns:p15="http://schemas.microsoft.com/office/powerpoint/2012/main"/>
+    </p:ext>
+  </p:extLst>
 </p:presentation>
+</file>
+
+<file path=ppt/changesInfos/changesInfo1.xml><?xml version="1.0" encoding="utf-8"?>
+<pc:chgInfo xmlns:a="http://schemas.openxmlformats.org/drawingml/2006/main" xmlns:r="http://schemas.openxmlformats.org/officeDocument/2006/relationships" xmlns:ac="http://schemas.microsoft.com/office/drawing/2013/main/command" xmlns:pc="http://schemas.microsoft.com/office/powerpoint/2013/main/command">
+  <pc:docChgLst>
+    <pc:chgData name="Mitch McCoard" userId="58f5e4d4-609b-45e1-9076-118fada03696" providerId="ADAL" clId="{D821F8F6-9747-4A4F-A321-2638AC8545ED}"/>
+    <pc:docChg chg="modSld">
+      <pc:chgData name="Mitch McCoard" userId="58f5e4d4-609b-45e1-9076-118fada03696" providerId="ADAL" clId="{D821F8F6-9747-4A4F-A321-2638AC8545ED}" dt="2024-05-21T16:04:48.280" v="39" actId="20577"/>
+      <pc:docMkLst>
+        <pc:docMk/>
+      </pc:docMkLst>
+      <pc:sldChg chg="modSp mod">
+        <pc:chgData name="Mitch McCoard" userId="58f5e4d4-609b-45e1-9076-118fada03696" providerId="ADAL" clId="{D821F8F6-9747-4A4F-A321-2638AC8545ED}" dt="2024-05-21T16:04:48.280" v="39" actId="20577"/>
+        <pc:sldMkLst>
+          <pc:docMk/>
+          <pc:sldMk cId="2504923741" sldId="256"/>
+        </pc:sldMkLst>
+        <pc:spChg chg="mod">
+          <ac:chgData name="Mitch McCoard" userId="58f5e4d4-609b-45e1-9076-118fada03696" providerId="ADAL" clId="{D821F8F6-9747-4A4F-A321-2638AC8545ED}" dt="2024-05-21T16:04:48.280" v="39" actId="20577"/>
+          <ac:spMkLst>
+            <pc:docMk/>
+            <pc:sldMk cId="2504923741" sldId="256"/>
+            <ac:spMk id="2" creationId="{4A1EFAB5-3319-E676-270F-649DA572BE7A}"/>
+          </ac:spMkLst>
+        </pc:spChg>
+      </pc:sldChg>
+    </pc:docChg>
+  </pc:docChgLst>
+</pc:chgInfo>
 </file>
 
 <file path=ppt/slideLayouts/slideLayout1.xml><?xml version="1.0" encoding="utf-8"?>
@@ -3342,7 +3376,18 @@
           <a:bodyPr/>
           <a:lstStyle/>
           <a:p>
-            <a:endParaRPr lang="en-US"/>
+            <a:r>
+              <a:rPr lang="en-US" dirty="0"/>
+              <a:t>This is the new </a:t>
+            </a:r>
+            <a:r>
+              <a:rPr lang="en-US" dirty="0" err="1"/>
+              <a:t>editSlides</a:t>
+            </a:r>
+            <a:r>
+              <a:rPr lang="en-US" dirty="0"/>
+              <a:t> Deck!</a:t>
+            </a:r>
           </a:p>
         </p:txBody>
       </p:sp>

</xml_diff>